<commit_message>
Made slides for presentation
</commit_message>
<xml_diff>
--- a/latex/Figures/graphics.pptx
+++ b/latex/Figures/graphics.pptx
@@ -257,7 +257,7 @@
           <a:p>
             <a:fld id="{A5A5972C-82DA-4DF1-958E-FA9D5BA309D2}" type="datetimeFigureOut">
               <a:rPr lang="en-US" smtClean="0"/>
-              <a:t>11/16/2016</a:t>
+              <a:t>12/5/2016</a:t>
             </a:fld>
             <a:endParaRPr lang="en-US"/>
           </a:p>
@@ -427,7 +427,7 @@
           <a:p>
             <a:fld id="{A5A5972C-82DA-4DF1-958E-FA9D5BA309D2}" type="datetimeFigureOut">
               <a:rPr lang="en-US" smtClean="0"/>
-              <a:t>11/16/2016</a:t>
+              <a:t>12/5/2016</a:t>
             </a:fld>
             <a:endParaRPr lang="en-US"/>
           </a:p>
@@ -607,7 +607,7 @@
           <a:p>
             <a:fld id="{A5A5972C-82DA-4DF1-958E-FA9D5BA309D2}" type="datetimeFigureOut">
               <a:rPr lang="en-US" smtClean="0"/>
-              <a:t>11/16/2016</a:t>
+              <a:t>12/5/2016</a:t>
             </a:fld>
             <a:endParaRPr lang="en-US"/>
           </a:p>
@@ -777,7 +777,7 @@
           <a:p>
             <a:fld id="{A5A5972C-82DA-4DF1-958E-FA9D5BA309D2}" type="datetimeFigureOut">
               <a:rPr lang="en-US" smtClean="0"/>
-              <a:t>11/16/2016</a:t>
+              <a:t>12/5/2016</a:t>
             </a:fld>
             <a:endParaRPr lang="en-US"/>
           </a:p>
@@ -1021,7 +1021,7 @@
           <a:p>
             <a:fld id="{A5A5972C-82DA-4DF1-958E-FA9D5BA309D2}" type="datetimeFigureOut">
               <a:rPr lang="en-US" smtClean="0"/>
-              <a:t>11/16/2016</a:t>
+              <a:t>12/5/2016</a:t>
             </a:fld>
             <a:endParaRPr lang="en-US"/>
           </a:p>
@@ -1253,7 +1253,7 @@
           <a:p>
             <a:fld id="{A5A5972C-82DA-4DF1-958E-FA9D5BA309D2}" type="datetimeFigureOut">
               <a:rPr lang="en-US" smtClean="0"/>
-              <a:t>11/16/2016</a:t>
+              <a:t>12/5/2016</a:t>
             </a:fld>
             <a:endParaRPr lang="en-US"/>
           </a:p>
@@ -1620,7 +1620,7 @@
           <a:p>
             <a:fld id="{A5A5972C-82DA-4DF1-958E-FA9D5BA309D2}" type="datetimeFigureOut">
               <a:rPr lang="en-US" smtClean="0"/>
-              <a:t>11/16/2016</a:t>
+              <a:t>12/5/2016</a:t>
             </a:fld>
             <a:endParaRPr lang="en-US"/>
           </a:p>
@@ -1738,7 +1738,7 @@
           <a:p>
             <a:fld id="{A5A5972C-82DA-4DF1-958E-FA9D5BA309D2}" type="datetimeFigureOut">
               <a:rPr lang="en-US" smtClean="0"/>
-              <a:t>11/16/2016</a:t>
+              <a:t>12/5/2016</a:t>
             </a:fld>
             <a:endParaRPr lang="en-US"/>
           </a:p>
@@ -1833,7 +1833,7 @@
           <a:p>
             <a:fld id="{A5A5972C-82DA-4DF1-958E-FA9D5BA309D2}" type="datetimeFigureOut">
               <a:rPr lang="en-US" smtClean="0"/>
-              <a:t>11/16/2016</a:t>
+              <a:t>12/5/2016</a:t>
             </a:fld>
             <a:endParaRPr lang="en-US"/>
           </a:p>
@@ -2110,7 +2110,7 @@
           <a:p>
             <a:fld id="{A5A5972C-82DA-4DF1-958E-FA9D5BA309D2}" type="datetimeFigureOut">
               <a:rPr lang="en-US" smtClean="0"/>
-              <a:t>11/16/2016</a:t>
+              <a:t>12/5/2016</a:t>
             </a:fld>
             <a:endParaRPr lang="en-US"/>
           </a:p>
@@ -2367,7 +2367,7 @@
           <a:p>
             <a:fld id="{A5A5972C-82DA-4DF1-958E-FA9D5BA309D2}" type="datetimeFigureOut">
               <a:rPr lang="en-US" smtClean="0"/>
-              <a:t>11/16/2016</a:t>
+              <a:t>12/5/2016</a:t>
             </a:fld>
             <a:endParaRPr lang="en-US"/>
           </a:p>
@@ -2580,7 +2580,7 @@
           <a:p>
             <a:fld id="{A5A5972C-82DA-4DF1-958E-FA9D5BA309D2}" type="datetimeFigureOut">
               <a:rPr lang="en-US" smtClean="0"/>
-              <a:t>11/16/2016</a:t>
+              <a:t>12/5/2016</a:t>
             </a:fld>
             <a:endParaRPr lang="en-US"/>
           </a:p>
@@ -8842,7 +8842,7 @@
       </p:grpSpPr>
       <p:grpSp>
         <p:nvGrpSpPr>
-          <p:cNvPr id="39" name="Group 38"/>
+          <p:cNvPr id="2" name="Group 1"/>
           <p:cNvGrpSpPr/>
           <p:nvPr/>
         </p:nvGrpSpPr>
@@ -10769,8 +10769,8 @@
             </p:nvSpPr>
             <p:spPr>
               <a:xfrm>
-                <a:off x="2230722" y="3248764"/>
-                <a:ext cx="603087" cy="603087"/>
+                <a:off x="2230722" y="3204755"/>
+                <a:ext cx="647098" cy="647098"/>
               </a:xfrm>
               <a:prstGeom prst="ellipse">
                 <a:avLst/>
@@ -10814,7 +10814,7 @@
                       <a:schemeClr val="bg1"/>
                     </a:solidFill>
                   </a:rPr>
-                  <a:t>Constrain</a:t>
+                  <a:t>Constraint</a:t>
                 </a:r>
                 <a:endParaRPr lang="en-US" sz="1400" dirty="0">
                   <a:solidFill>
@@ -10835,8 +10835,8 @@
           </p:nvSpPr>
           <p:spPr>
             <a:xfrm>
-              <a:off x="5791687" y="2229448"/>
-              <a:ext cx="874575" cy="874575"/>
+              <a:off x="5791687" y="2153588"/>
+              <a:ext cx="950436" cy="950436"/>
             </a:xfrm>
             <a:prstGeom prst="ellipse">
               <a:avLst/>
@@ -10880,7 +10880,7 @@
                     <a:schemeClr val="bg1"/>
                   </a:solidFill>
                 </a:rPr>
-                <a:t>Constrain</a:t>
+                <a:t>Constraint</a:t>
               </a:r>
               <a:endParaRPr lang="en-US" sz="1400" dirty="0">
                 <a:solidFill>

</xml_diff>